<commit_message>
fixed locked directory sharing + persistent login links
</commit_message>
<xml_diff>
--- a/icons.pptx
+++ b/icons.pptx
@@ -7,13 +7,14 @@
   <p:sldIdLst>
     <p:sldId id="256" r:id="rId2"/>
     <p:sldId id="263" r:id="rId3"/>
-    <p:sldId id="261" r:id="rId4"/>
-    <p:sldId id="264" r:id="rId5"/>
-    <p:sldId id="257" r:id="rId6"/>
-    <p:sldId id="258" r:id="rId7"/>
-    <p:sldId id="260" r:id="rId8"/>
-    <p:sldId id="259" r:id="rId9"/>
-    <p:sldId id="262" r:id="rId10"/>
+    <p:sldId id="265" r:id="rId4"/>
+    <p:sldId id="261" r:id="rId5"/>
+    <p:sldId id="264" r:id="rId6"/>
+    <p:sldId id="257" r:id="rId7"/>
+    <p:sldId id="258" r:id="rId8"/>
+    <p:sldId id="260" r:id="rId9"/>
+    <p:sldId id="259" r:id="rId10"/>
+    <p:sldId id="262" r:id="rId11"/>
   </p:sldIdLst>
   <p:sldSz cx="12192000" cy="6858000"/>
   <p:notesSz cx="6858000" cy="9144000"/>
@@ -3883,7 +3884,7 @@
 </p:sld>
 </file>
 
-<file path=ppt/slides/slide2.xml><?xml version="1.0" encoding="utf-8"?>
+<file path=ppt/slides/slide10.xml><?xml version="1.0" encoding="utf-8"?>
 <p:sld xmlns:a="http://schemas.openxmlformats.org/drawingml/2006/main" xmlns:r="http://schemas.openxmlformats.org/officeDocument/2006/relationships" xmlns:p="http://schemas.openxmlformats.org/presentationml/2006/main">
   <p:cSld>
     <p:spTree>
@@ -3902,10 +3903,10 @@
       </p:grpSpPr>
       <p:grpSp>
         <p:nvGrpSpPr>
-          <p:cNvPr id="16" name="Group 15">
-            <a:extLst>
-              <a:ext uri="{FF2B5EF4-FFF2-40B4-BE49-F238E27FC236}">
-                <a16:creationId xmlns:a16="http://schemas.microsoft.com/office/drawing/2014/main" id="{F8138D94-AD05-D545-B00C-1DBB589F8245}"/>
+          <p:cNvPr id="14" name="Group 13">
+            <a:extLst>
+              <a:ext uri="{FF2B5EF4-FFF2-40B4-BE49-F238E27FC236}">
+                <a16:creationId xmlns:a16="http://schemas.microsoft.com/office/drawing/2014/main" id="{5F00CA81-8DE0-0A4C-BF8B-E48C2C1B7907}"/>
               </a:ext>
             </a:extLst>
           </p:cNvPr>
@@ -3914,7 +3915,627 @@
         </p:nvGrpSpPr>
         <p:grpSpPr>
           <a:xfrm>
-            <a:off x="3515773" y="3009235"/>
+            <a:off x="2652799" y="1686179"/>
+            <a:ext cx="3657600" cy="3657600"/>
+            <a:chOff x="2652799" y="1686179"/>
+            <a:chExt cx="3657600" cy="3657600"/>
+          </a:xfrm>
+        </p:grpSpPr>
+        <p:sp>
+          <p:nvSpPr>
+            <p:cNvPr id="5" name="Oval 4">
+              <a:extLst>
+                <a:ext uri="{FF2B5EF4-FFF2-40B4-BE49-F238E27FC236}">
+                  <a16:creationId xmlns:a16="http://schemas.microsoft.com/office/drawing/2014/main" id="{4FA07E0E-649D-6C4D-8516-27C02727DD97}"/>
+                </a:ext>
+              </a:extLst>
+            </p:cNvPr>
+            <p:cNvSpPr/>
+            <p:nvPr/>
+          </p:nvSpPr>
+          <p:spPr>
+            <a:xfrm>
+              <a:off x="2652799" y="1686179"/>
+              <a:ext cx="3657600" cy="3657600"/>
+            </a:xfrm>
+            <a:prstGeom prst="ellipse">
+              <a:avLst/>
+            </a:prstGeom>
+            <a:solidFill>
+              <a:srgbClr val="935FB2"/>
+            </a:solidFill>
+            <a:ln>
+              <a:noFill/>
+            </a:ln>
+            <a:effectLst/>
+          </p:spPr>
+          <p:style>
+            <a:lnRef idx="2">
+              <a:schemeClr val="accent1">
+                <a:shade val="50000"/>
+              </a:schemeClr>
+            </a:lnRef>
+            <a:fillRef idx="1">
+              <a:schemeClr val="accent1"/>
+            </a:fillRef>
+            <a:effectRef idx="0">
+              <a:schemeClr val="accent1"/>
+            </a:effectRef>
+            <a:fontRef idx="minor">
+              <a:schemeClr val="lt1"/>
+            </a:fontRef>
+          </p:style>
+          <p:txBody>
+            <a:bodyPr rtlCol="0" anchor="ctr"/>
+            <a:lstStyle/>
+            <a:p>
+              <a:pPr algn="r"/>
+              <a:endParaRPr lang="en-US"/>
+            </a:p>
+          </p:txBody>
+        </p:sp>
+        <p:sp>
+          <p:nvSpPr>
+            <p:cNvPr id="6" name="Folded Corner 5">
+              <a:extLst>
+                <a:ext uri="{FF2B5EF4-FFF2-40B4-BE49-F238E27FC236}">
+                  <a16:creationId xmlns:a16="http://schemas.microsoft.com/office/drawing/2014/main" id="{03D8A4EE-828D-BA49-9EA2-43DF24757832}"/>
+                </a:ext>
+              </a:extLst>
+            </p:cNvPr>
+            <p:cNvSpPr/>
+            <p:nvPr/>
+          </p:nvSpPr>
+          <p:spPr>
+            <a:xfrm rot="10800000" flipH="1">
+              <a:off x="3632513" y="2479475"/>
+              <a:ext cx="1698171" cy="2071008"/>
+            </a:xfrm>
+            <a:prstGeom prst="foldedCorner">
+              <a:avLst>
+                <a:gd name="adj" fmla="val 38876"/>
+              </a:avLst>
+            </a:prstGeom>
+            <a:solidFill>
+              <a:schemeClr val="bg1"/>
+            </a:solidFill>
+            <a:ln>
+              <a:noFill/>
+            </a:ln>
+            <a:effectLst>
+              <a:outerShdw blurRad="93626" dist="97833" dir="2700000" algn="tl" rotWithShape="0">
+                <a:prstClr val="black">
+                  <a:alpha val="27026"/>
+                </a:prstClr>
+              </a:outerShdw>
+            </a:effectLst>
+          </p:spPr>
+          <p:style>
+            <a:lnRef idx="2">
+              <a:schemeClr val="accent1">
+                <a:shade val="50000"/>
+              </a:schemeClr>
+            </a:lnRef>
+            <a:fillRef idx="1">
+              <a:schemeClr val="accent1"/>
+            </a:fillRef>
+            <a:effectRef idx="0">
+              <a:schemeClr val="accent1"/>
+            </a:effectRef>
+            <a:fontRef idx="minor">
+              <a:schemeClr val="lt1"/>
+            </a:fontRef>
+          </p:style>
+          <p:txBody>
+            <a:bodyPr rtlCol="0" anchor="ctr"/>
+            <a:lstStyle/>
+            <a:p>
+              <a:pPr algn="r"/>
+              <a:endParaRPr lang="en-US" dirty="0"/>
+            </a:p>
+          </p:txBody>
+        </p:sp>
+        <p:sp>
+          <p:nvSpPr>
+            <p:cNvPr id="7" name="Right Triangle 6">
+              <a:extLst>
+                <a:ext uri="{FF2B5EF4-FFF2-40B4-BE49-F238E27FC236}">
+                  <a16:creationId xmlns:a16="http://schemas.microsoft.com/office/drawing/2014/main" id="{96A7A3DF-AB2B-774B-BB8A-FDD94167610E}"/>
+                </a:ext>
+              </a:extLst>
+            </p:cNvPr>
+            <p:cNvSpPr/>
+            <p:nvPr/>
+          </p:nvSpPr>
+          <p:spPr>
+            <a:xfrm>
+              <a:off x="4671010" y="2474395"/>
+              <a:ext cx="659674" cy="667568"/>
+            </a:xfrm>
+            <a:prstGeom prst="rtTriangle">
+              <a:avLst/>
+            </a:prstGeom>
+            <a:solidFill>
+              <a:srgbClr val="59396C"/>
+            </a:solidFill>
+            <a:ln>
+              <a:noFill/>
+            </a:ln>
+          </p:spPr>
+          <p:style>
+            <a:lnRef idx="2">
+              <a:schemeClr val="accent1">
+                <a:shade val="50000"/>
+              </a:schemeClr>
+            </a:lnRef>
+            <a:fillRef idx="1">
+              <a:schemeClr val="accent1"/>
+            </a:fillRef>
+            <a:effectRef idx="0">
+              <a:schemeClr val="accent1"/>
+            </a:effectRef>
+            <a:fontRef idx="minor">
+              <a:schemeClr val="lt1"/>
+            </a:fontRef>
+          </p:style>
+          <p:txBody>
+            <a:bodyPr rtlCol="0" anchor="ctr"/>
+            <a:lstStyle/>
+            <a:p>
+              <a:pPr algn="r"/>
+              <a:endParaRPr lang="en-US" dirty="0"/>
+            </a:p>
+          </p:txBody>
+        </p:sp>
+        <p:sp>
+          <p:nvSpPr>
+            <p:cNvPr id="8" name="Rounded Rectangle 7">
+              <a:extLst>
+                <a:ext uri="{FF2B5EF4-FFF2-40B4-BE49-F238E27FC236}">
+                  <a16:creationId xmlns:a16="http://schemas.microsoft.com/office/drawing/2014/main" id="{C5154D1B-2CB8-094B-AE28-726A79E91954}"/>
+                </a:ext>
+              </a:extLst>
+            </p:cNvPr>
+            <p:cNvSpPr/>
+            <p:nvPr/>
+          </p:nvSpPr>
+          <p:spPr>
+            <a:xfrm>
+              <a:off x="4112735" y="3405098"/>
+              <a:ext cx="801261" cy="103486"/>
+            </a:xfrm>
+            <a:prstGeom prst="roundRect">
+              <a:avLst/>
+            </a:prstGeom>
+            <a:solidFill>
+              <a:schemeClr val="bg1"/>
+            </a:solidFill>
+            <a:ln>
+              <a:noFill/>
+            </a:ln>
+          </p:spPr>
+          <p:style>
+            <a:lnRef idx="2">
+              <a:schemeClr val="accent1">
+                <a:shade val="50000"/>
+              </a:schemeClr>
+            </a:lnRef>
+            <a:fillRef idx="1">
+              <a:schemeClr val="accent1"/>
+            </a:fillRef>
+            <a:effectRef idx="0">
+              <a:schemeClr val="accent1"/>
+            </a:effectRef>
+            <a:fontRef idx="minor">
+              <a:schemeClr val="lt1"/>
+            </a:fontRef>
+          </p:style>
+          <p:txBody>
+            <a:bodyPr rtlCol="0" anchor="ctr"/>
+            <a:lstStyle/>
+            <a:p>
+              <a:pPr algn="r"/>
+              <a:endParaRPr lang="en-US"/>
+            </a:p>
+          </p:txBody>
+        </p:sp>
+        <p:sp>
+          <p:nvSpPr>
+            <p:cNvPr id="9" name="Rounded Rectangle 8">
+              <a:extLst>
+                <a:ext uri="{FF2B5EF4-FFF2-40B4-BE49-F238E27FC236}">
+                  <a16:creationId xmlns:a16="http://schemas.microsoft.com/office/drawing/2014/main" id="{31AC0A3B-0BF9-594C-BA71-6E136A2CE3EA}"/>
+                </a:ext>
+              </a:extLst>
+            </p:cNvPr>
+            <p:cNvSpPr/>
+            <p:nvPr/>
+          </p:nvSpPr>
+          <p:spPr>
+            <a:xfrm>
+              <a:off x="4112734" y="3599139"/>
+              <a:ext cx="801261" cy="114036"/>
+            </a:xfrm>
+            <a:prstGeom prst="roundRect">
+              <a:avLst/>
+            </a:prstGeom>
+            <a:solidFill>
+              <a:schemeClr val="bg1"/>
+            </a:solidFill>
+            <a:ln>
+              <a:noFill/>
+            </a:ln>
+          </p:spPr>
+          <p:style>
+            <a:lnRef idx="2">
+              <a:schemeClr val="accent1">
+                <a:shade val="50000"/>
+              </a:schemeClr>
+            </a:lnRef>
+            <a:fillRef idx="1">
+              <a:schemeClr val="accent1"/>
+            </a:fillRef>
+            <a:effectRef idx="0">
+              <a:schemeClr val="accent1"/>
+            </a:effectRef>
+            <a:fontRef idx="minor">
+              <a:schemeClr val="lt1"/>
+            </a:fontRef>
+          </p:style>
+          <p:txBody>
+            <a:bodyPr rtlCol="0" anchor="ctr"/>
+            <a:lstStyle/>
+            <a:p>
+              <a:pPr algn="r"/>
+              <a:endParaRPr lang="en-US"/>
+            </a:p>
+          </p:txBody>
+        </p:sp>
+        <p:sp>
+          <p:nvSpPr>
+            <p:cNvPr id="10" name="Rounded Rectangle 9">
+              <a:extLst>
+                <a:ext uri="{FF2B5EF4-FFF2-40B4-BE49-F238E27FC236}">
+                  <a16:creationId xmlns:a16="http://schemas.microsoft.com/office/drawing/2014/main" id="{D44F7BD0-123D-364B-A7A2-BFE0AA7C2FDA}"/>
+                </a:ext>
+              </a:extLst>
+            </p:cNvPr>
+            <p:cNvSpPr/>
+            <p:nvPr/>
+          </p:nvSpPr>
+          <p:spPr>
+            <a:xfrm>
+              <a:off x="4112734" y="3813743"/>
+              <a:ext cx="801261" cy="114036"/>
+            </a:xfrm>
+            <a:prstGeom prst="roundRect">
+              <a:avLst/>
+            </a:prstGeom>
+            <a:solidFill>
+              <a:schemeClr val="bg1"/>
+            </a:solidFill>
+            <a:ln>
+              <a:noFill/>
+            </a:ln>
+          </p:spPr>
+          <p:style>
+            <a:lnRef idx="2">
+              <a:schemeClr val="accent1">
+                <a:shade val="50000"/>
+              </a:schemeClr>
+            </a:lnRef>
+            <a:fillRef idx="1">
+              <a:schemeClr val="accent1"/>
+            </a:fillRef>
+            <a:effectRef idx="0">
+              <a:schemeClr val="accent1"/>
+            </a:effectRef>
+            <a:fontRef idx="minor">
+              <a:schemeClr val="lt1"/>
+            </a:fontRef>
+          </p:style>
+          <p:txBody>
+            <a:bodyPr rtlCol="0" anchor="ctr"/>
+            <a:lstStyle/>
+            <a:p>
+              <a:pPr algn="r"/>
+              <a:endParaRPr lang="en-US"/>
+            </a:p>
+          </p:txBody>
+        </p:sp>
+        <p:sp>
+          <p:nvSpPr>
+            <p:cNvPr id="12" name="Oval 11">
+              <a:extLst>
+                <a:ext uri="{FF2B5EF4-FFF2-40B4-BE49-F238E27FC236}">
+                  <a16:creationId xmlns:a16="http://schemas.microsoft.com/office/drawing/2014/main" id="{0DBA4606-935D-B144-A85D-10532E93C82D}"/>
+                </a:ext>
+              </a:extLst>
+            </p:cNvPr>
+            <p:cNvSpPr/>
+            <p:nvPr/>
+          </p:nvSpPr>
+          <p:spPr>
+            <a:xfrm>
+              <a:off x="4023361" y="3148494"/>
+              <a:ext cx="920932" cy="894460"/>
+            </a:xfrm>
+            <a:prstGeom prst="ellipse">
+              <a:avLst/>
+            </a:prstGeom>
+            <a:solidFill>
+              <a:srgbClr val="935FB2"/>
+            </a:solidFill>
+            <a:ln>
+              <a:noFill/>
+            </a:ln>
+          </p:spPr>
+          <p:style>
+            <a:lnRef idx="2">
+              <a:schemeClr val="accent1">
+                <a:shade val="50000"/>
+              </a:schemeClr>
+            </a:lnRef>
+            <a:fillRef idx="1">
+              <a:schemeClr val="accent1"/>
+            </a:fillRef>
+            <a:effectRef idx="0">
+              <a:schemeClr val="accent1"/>
+            </a:effectRef>
+            <a:fontRef idx="minor">
+              <a:schemeClr val="lt1"/>
+            </a:fontRef>
+          </p:style>
+          <p:txBody>
+            <a:bodyPr rtlCol="0" anchor="ctr"/>
+            <a:lstStyle/>
+            <a:p>
+              <a:pPr algn="ctr"/>
+              <a:endParaRPr lang="en-US" dirty="0"/>
+            </a:p>
+          </p:txBody>
+        </p:sp>
+        <p:sp>
+          <p:nvSpPr>
+            <p:cNvPr id="13" name="Triangle 12">
+              <a:extLst>
+                <a:ext uri="{FF2B5EF4-FFF2-40B4-BE49-F238E27FC236}">
+                  <a16:creationId xmlns:a16="http://schemas.microsoft.com/office/drawing/2014/main" id="{9F017A09-C57B-3A4F-9E05-EDB7910E1694}"/>
+                </a:ext>
+              </a:extLst>
+            </p:cNvPr>
+            <p:cNvSpPr/>
+            <p:nvPr/>
+          </p:nvSpPr>
+          <p:spPr>
+            <a:xfrm rot="5400000">
+              <a:off x="4323943" y="3386829"/>
+              <a:ext cx="411480" cy="411480"/>
+            </a:xfrm>
+            <a:prstGeom prst="triangle">
+              <a:avLst/>
+            </a:prstGeom>
+            <a:solidFill>
+              <a:schemeClr val="bg1"/>
+            </a:solidFill>
+            <a:ln>
+              <a:noFill/>
+            </a:ln>
+          </p:spPr>
+          <p:style>
+            <a:lnRef idx="2">
+              <a:schemeClr val="accent1">
+                <a:shade val="50000"/>
+              </a:schemeClr>
+            </a:lnRef>
+            <a:fillRef idx="1">
+              <a:schemeClr val="accent1"/>
+            </a:fillRef>
+            <a:effectRef idx="0">
+              <a:schemeClr val="accent1"/>
+            </a:effectRef>
+            <a:fontRef idx="minor">
+              <a:schemeClr val="lt1"/>
+            </a:fontRef>
+          </p:style>
+          <p:txBody>
+            <a:bodyPr rtlCol="0" anchor="ctr"/>
+            <a:lstStyle/>
+            <a:p>
+              <a:pPr algn="ctr"/>
+              <a:endParaRPr lang="en-US"/>
+            </a:p>
+          </p:txBody>
+        </p:sp>
+      </p:grpSp>
+    </p:spTree>
+    <p:extLst>
+      <p:ext uri="{BB962C8B-B14F-4D97-AF65-F5344CB8AC3E}">
+        <p14:creationId xmlns:p14="http://schemas.microsoft.com/office/powerpoint/2010/main" val="925314315"/>
+      </p:ext>
+    </p:extLst>
+  </p:cSld>
+  <p:clrMapOvr>
+    <a:masterClrMapping/>
+  </p:clrMapOvr>
+</p:sld>
+</file>
+
+<file path=ppt/slides/slide2.xml><?xml version="1.0" encoding="utf-8"?>
+<p:sld xmlns:a="http://schemas.openxmlformats.org/drawingml/2006/main" xmlns:r="http://schemas.openxmlformats.org/officeDocument/2006/relationships" xmlns:p="http://schemas.openxmlformats.org/presentationml/2006/main">
+  <p:cSld>
+    <p:spTree>
+      <p:nvGrpSpPr>
+        <p:cNvPr id="1" name=""/>
+        <p:cNvGrpSpPr/>
+        <p:nvPr/>
+      </p:nvGrpSpPr>
+      <p:grpSpPr>
+        <a:xfrm>
+          <a:off x="0" y="0"/>
+          <a:ext cx="0" cy="0"/>
+          <a:chOff x="0" y="0"/>
+          <a:chExt cx="0" cy="0"/>
+        </a:xfrm>
+      </p:grpSpPr>
+      <p:sp>
+        <p:nvSpPr>
+          <p:cNvPr id="13" name="TextBox 12">
+            <a:extLst>
+              <a:ext uri="{FF2B5EF4-FFF2-40B4-BE49-F238E27FC236}">
+                <a16:creationId xmlns:a16="http://schemas.microsoft.com/office/drawing/2014/main" id="{C845D006-3F05-D344-9D70-BD2A80275EEF}"/>
+              </a:ext>
+            </a:extLst>
+          </p:cNvPr>
+          <p:cNvSpPr txBox="1"/>
+          <p:nvPr/>
+        </p:nvSpPr>
+        <p:spPr>
+          <a:xfrm>
+            <a:off x="3515773" y="3318143"/>
+            <a:ext cx="2225225" cy="1938992"/>
+          </a:xfrm>
+          <a:prstGeom prst="rect">
+            <a:avLst/>
+          </a:prstGeom>
+          <a:noFill/>
+        </p:spPr>
+        <p:txBody>
+          <a:bodyPr wrap="square" rtlCol="0">
+            <a:spAutoFit/>
+          </a:bodyPr>
+          <a:lstStyle/>
+          <a:p>
+            <a:r>
+              <a:rPr lang="en-US" sz="12000" b="1" i="1" dirty="0">
+                <a:solidFill>
+                  <a:schemeClr val="bg2"/>
+                </a:solidFill>
+                <a:latin typeface="Britannic Bold" panose="020B0903060703020204" pitchFamily="34" charset="77"/>
+                <a:cs typeface="Aharoni" panose="02010803020104030203" pitchFamily="2" charset="-79"/>
+              </a:rPr>
+              <a:t>Wi</a:t>
+            </a:r>
+          </a:p>
+        </p:txBody>
+      </p:sp>
+      <p:sp>
+        <p:nvSpPr>
+          <p:cNvPr id="14" name="TextBox 13">
+            <a:extLst>
+              <a:ext uri="{FF2B5EF4-FFF2-40B4-BE49-F238E27FC236}">
+                <a16:creationId xmlns:a16="http://schemas.microsoft.com/office/drawing/2014/main" id="{69A3AC2C-9F89-FE44-A690-E1954B93901C}"/>
+              </a:ext>
+            </a:extLst>
+          </p:cNvPr>
+          <p:cNvSpPr txBox="1"/>
+          <p:nvPr/>
+        </p:nvSpPr>
+        <p:spPr>
+          <a:xfrm>
+            <a:off x="5200294" y="3344447"/>
+            <a:ext cx="2856028" cy="1938992"/>
+          </a:xfrm>
+          <a:prstGeom prst="rect">
+            <a:avLst/>
+          </a:prstGeom>
+          <a:noFill/>
+          <a:ln>
+            <a:noFill/>
+          </a:ln>
+        </p:spPr>
+        <p:txBody>
+          <a:bodyPr wrap="square" rtlCol="0">
+            <a:spAutoFit/>
+          </a:bodyPr>
+          <a:lstStyle/>
+          <a:p>
+            <a:r>
+              <a:rPr lang="en-US" sz="12000" b="1" i="1" dirty="0">
+                <a:solidFill>
+                  <a:schemeClr val="bg2"/>
+                </a:solidFill>
+                <a:latin typeface="Britannic Bold" panose="020B0903060703020204" pitchFamily="34" charset="77"/>
+                <a:cs typeface="Aharoni" panose="02010803020104030203" pitchFamily="2" charset="-79"/>
+              </a:rPr>
+              <a:t>File</a:t>
+            </a:r>
+          </a:p>
+        </p:txBody>
+      </p:sp>
+      <p:pic>
+        <p:nvPicPr>
+          <p:cNvPr id="15" name="Picture 2" descr="Free PNGs - Icon free PNG images | 100% free transparent cutout images">
+            <a:extLst>
+              <a:ext uri="{FF2B5EF4-FFF2-40B4-BE49-F238E27FC236}">
+                <a16:creationId xmlns:a16="http://schemas.microsoft.com/office/drawing/2014/main" id="{F35BE905-AA17-E94F-B84E-F6CC2EC61672}"/>
+              </a:ext>
+            </a:extLst>
+          </p:cNvPr>
+          <p:cNvPicPr>
+            <a:picLocks noChangeAspect="1" noChangeArrowheads="1"/>
+          </p:cNvPicPr>
+          <p:nvPr/>
+        </p:nvPicPr>
+        <p:blipFill rotWithShape="1">
+          <a:blip r:embed="rId2">
+            <a:lum bright="70000" contrast="-70000"/>
+            <a:extLst>
+              <a:ext uri="{BEBA8EAE-BF5A-486C-A8C5-ECC9F3942E4B}">
+                <a14:imgProps xmlns:a14="http://schemas.microsoft.com/office/drawing/2010/main">
+                  <a14:imgLayer r:embed="rId3">
+                    <a14:imgEffect>
+                      <a14:colorTemperature colorTemp="4539"/>
+                    </a14:imgEffect>
+                    <a14:imgEffect>
+                      <a14:saturation sat="113000"/>
+                    </a14:imgEffect>
+                  </a14:imgLayer>
+                </a14:imgProps>
+              </a:ext>
+              <a:ext uri="{28A0092B-C50C-407E-A947-70E740481C1C}">
+                <a14:useLocalDpi xmlns:a14="http://schemas.microsoft.com/office/drawing/2010/main" val="0"/>
+              </a:ext>
+            </a:extLst>
+          </a:blip>
+          <a:srcRect b="23756"/>
+          <a:stretch/>
+        </p:blipFill>
+        <p:spPr bwMode="auto">
+          <a:xfrm>
+            <a:off x="6071149" y="3009236"/>
+            <a:ext cx="1078823" cy="822536"/>
+          </a:xfrm>
+          <a:prstGeom prst="rect">
+            <a:avLst/>
+          </a:prstGeom>
+          <a:noFill/>
+          <a:extLst>
+            <a:ext uri="{909E8E84-426E-40DD-AFC4-6F175D3DCCD1}">
+              <a14:hiddenFill xmlns:a14="http://schemas.microsoft.com/office/drawing/2010/main">
+                <a:solidFill>
+                  <a:srgbClr val="FFFFFF"/>
+                </a:solidFill>
+              </a14:hiddenFill>
+            </a:ext>
+          </a:extLst>
+        </p:spPr>
+      </p:pic>
+      <p:grpSp>
+        <p:nvGrpSpPr>
+          <p:cNvPr id="6" name="Group 5">
+            <a:extLst>
+              <a:ext uri="{FF2B5EF4-FFF2-40B4-BE49-F238E27FC236}">
+                <a16:creationId xmlns:a16="http://schemas.microsoft.com/office/drawing/2014/main" id="{5E153874-1389-2A4F-8F60-30804CE8145B}"/>
+              </a:ext>
+            </a:extLst>
+          </p:cNvPr>
+          <p:cNvGrpSpPr/>
+          <p:nvPr/>
+        </p:nvGrpSpPr>
+        <p:grpSpPr>
+          <a:xfrm>
+            <a:off x="2087759" y="463763"/>
             <a:ext cx="4540549" cy="2274204"/>
             <a:chOff x="3870775" y="4698186"/>
             <a:chExt cx="4540549" cy="2274204"/>
@@ -3922,10 +4543,10 @@
         </p:grpSpPr>
         <p:sp>
           <p:nvSpPr>
-            <p:cNvPr id="13" name="TextBox 12">
+            <p:cNvPr id="7" name="TextBox 6">
               <a:extLst>
                 <a:ext uri="{FF2B5EF4-FFF2-40B4-BE49-F238E27FC236}">
-                  <a16:creationId xmlns:a16="http://schemas.microsoft.com/office/drawing/2014/main" id="{C845D006-3F05-D344-9D70-BD2A80275EEF}"/>
+                  <a16:creationId xmlns:a16="http://schemas.microsoft.com/office/drawing/2014/main" id="{62709F98-85E9-A94A-96D7-C2605FE152BF}"/>
                 </a:ext>
               </a:extLst>
             </p:cNvPr>
@@ -3963,10 +4584,10 @@
         </p:sp>
         <p:sp>
           <p:nvSpPr>
-            <p:cNvPr id="14" name="TextBox 13">
+            <p:cNvPr id="8" name="TextBox 7">
               <a:extLst>
                 <a:ext uri="{FF2B5EF4-FFF2-40B4-BE49-F238E27FC236}">
-                  <a16:creationId xmlns:a16="http://schemas.microsoft.com/office/drawing/2014/main" id="{69A3AC2C-9F89-FE44-A690-E1954B93901C}"/>
+                  <a16:creationId xmlns:a16="http://schemas.microsoft.com/office/drawing/2014/main" id="{975D0EFB-3ADF-DA43-82CA-8EB3C627DAAC}"/>
                 </a:ext>
               </a:extLst>
             </p:cNvPr>
@@ -4004,10 +4625,10 @@
         </p:sp>
         <p:pic>
           <p:nvPicPr>
-            <p:cNvPr id="15" name="Picture 2" descr="Free PNGs - Icon free PNG images | 100% free transparent cutout images">
+            <p:cNvPr id="9" name="Picture 2" descr="Free PNGs - Icon free PNG images | 100% free transparent cutout images">
               <a:extLst>
                 <a:ext uri="{FF2B5EF4-FFF2-40B4-BE49-F238E27FC236}">
-                  <a16:creationId xmlns:a16="http://schemas.microsoft.com/office/drawing/2014/main" id="{F35BE905-AA17-E94F-B84E-F6CC2EC61672}"/>
+                  <a16:creationId xmlns:a16="http://schemas.microsoft.com/office/drawing/2014/main" id="{F73C8B04-E124-A344-9EE7-5430F90C3A17}"/>
                 </a:ext>
               </a:extLst>
             </p:cNvPr>
@@ -4017,7 +4638,7 @@
             <p:nvPr/>
           </p:nvPicPr>
           <p:blipFill>
-            <a:blip r:embed="rId2">
+            <a:blip r:embed="rId4">
               <a:extLst>
                 <a:ext uri="{28A0092B-C50C-407E-A947-70E740481C1C}">
                   <a14:useLocalDpi xmlns:a14="http://schemas.microsoft.com/office/drawing/2010/main" val="0"/>
@@ -4064,6 +4685,200 @@
 </file>
 
 <file path=ppt/slides/slide3.xml><?xml version="1.0" encoding="utf-8"?>
+<p:sld xmlns:a="http://schemas.openxmlformats.org/drawingml/2006/main" xmlns:r="http://schemas.openxmlformats.org/officeDocument/2006/relationships" xmlns:p="http://schemas.openxmlformats.org/presentationml/2006/main">
+  <p:cSld>
+    <p:spTree>
+      <p:nvGrpSpPr>
+        <p:cNvPr id="1" name=""/>
+        <p:cNvGrpSpPr/>
+        <p:nvPr/>
+      </p:nvGrpSpPr>
+      <p:grpSpPr>
+        <a:xfrm>
+          <a:off x="0" y="0"/>
+          <a:ext cx="0" cy="0"/>
+          <a:chOff x="0" y="0"/>
+          <a:chExt cx="0" cy="0"/>
+        </a:xfrm>
+      </p:grpSpPr>
+      <p:grpSp>
+        <p:nvGrpSpPr>
+          <p:cNvPr id="7" name="Group 6">
+            <a:extLst>
+              <a:ext uri="{FF2B5EF4-FFF2-40B4-BE49-F238E27FC236}">
+                <a16:creationId xmlns:a16="http://schemas.microsoft.com/office/drawing/2014/main" id="{35F37AC0-0E87-884B-87E6-0AB7D32E1C28}"/>
+              </a:ext>
+            </a:extLst>
+          </p:cNvPr>
+          <p:cNvGrpSpPr/>
+          <p:nvPr/>
+        </p:nvGrpSpPr>
+        <p:grpSpPr>
+          <a:xfrm>
+            <a:off x="3515773" y="3009236"/>
+            <a:ext cx="4540549" cy="2274203"/>
+            <a:chOff x="3515773" y="3009236"/>
+            <a:chExt cx="4540549" cy="2274203"/>
+          </a:xfrm>
+        </p:grpSpPr>
+        <p:sp>
+          <p:nvSpPr>
+            <p:cNvPr id="4" name="TextBox 3">
+              <a:extLst>
+                <a:ext uri="{FF2B5EF4-FFF2-40B4-BE49-F238E27FC236}">
+                  <a16:creationId xmlns:a16="http://schemas.microsoft.com/office/drawing/2014/main" id="{385F032E-797F-D64E-994C-473A55BFA987}"/>
+                </a:ext>
+              </a:extLst>
+            </p:cNvPr>
+            <p:cNvSpPr txBox="1"/>
+            <p:nvPr/>
+          </p:nvSpPr>
+          <p:spPr>
+            <a:xfrm>
+              <a:off x="3515773" y="3318143"/>
+              <a:ext cx="2225225" cy="1938992"/>
+            </a:xfrm>
+            <a:prstGeom prst="rect">
+              <a:avLst/>
+            </a:prstGeom>
+            <a:noFill/>
+          </p:spPr>
+          <p:txBody>
+            <a:bodyPr wrap="square" rtlCol="0">
+              <a:spAutoFit/>
+            </a:bodyPr>
+            <a:lstStyle/>
+            <a:p>
+              <a:r>
+                <a:rPr lang="en-US" sz="12000" b="1" i="1" dirty="0">
+                  <a:solidFill>
+                    <a:schemeClr val="bg2"/>
+                  </a:solidFill>
+                  <a:latin typeface="Britannic Bold" panose="020B0903060703020204" pitchFamily="34" charset="77"/>
+                  <a:cs typeface="Aharoni" panose="02010803020104030203" pitchFamily="2" charset="-79"/>
+                </a:rPr>
+                <a:t>Wi</a:t>
+              </a:r>
+            </a:p>
+          </p:txBody>
+        </p:sp>
+        <p:sp>
+          <p:nvSpPr>
+            <p:cNvPr id="5" name="TextBox 4">
+              <a:extLst>
+                <a:ext uri="{FF2B5EF4-FFF2-40B4-BE49-F238E27FC236}">
+                  <a16:creationId xmlns:a16="http://schemas.microsoft.com/office/drawing/2014/main" id="{B6BC49EF-12FC-1042-9211-259AFEDD458D}"/>
+                </a:ext>
+              </a:extLst>
+            </p:cNvPr>
+            <p:cNvSpPr txBox="1"/>
+            <p:nvPr/>
+          </p:nvSpPr>
+          <p:spPr>
+            <a:xfrm>
+              <a:off x="5200294" y="3344447"/>
+              <a:ext cx="2856028" cy="1938992"/>
+            </a:xfrm>
+            <a:prstGeom prst="rect">
+              <a:avLst/>
+            </a:prstGeom>
+            <a:noFill/>
+            <a:ln>
+              <a:noFill/>
+            </a:ln>
+          </p:spPr>
+          <p:txBody>
+            <a:bodyPr wrap="square" rtlCol="0">
+              <a:spAutoFit/>
+            </a:bodyPr>
+            <a:lstStyle/>
+            <a:p>
+              <a:r>
+                <a:rPr lang="en-US" sz="12000" b="1" i="1" dirty="0">
+                  <a:solidFill>
+                    <a:schemeClr val="bg2"/>
+                  </a:solidFill>
+                  <a:latin typeface="Britannic Bold" panose="020B0903060703020204" pitchFamily="34" charset="77"/>
+                  <a:cs typeface="Aharoni" panose="02010803020104030203" pitchFamily="2" charset="-79"/>
+                </a:rPr>
+                <a:t>File</a:t>
+              </a:r>
+            </a:p>
+          </p:txBody>
+        </p:sp>
+        <p:pic>
+          <p:nvPicPr>
+            <p:cNvPr id="6" name="Picture 2" descr="Free PNGs - Icon free PNG images | 100% free transparent cutout images">
+              <a:extLst>
+                <a:ext uri="{FF2B5EF4-FFF2-40B4-BE49-F238E27FC236}">
+                  <a16:creationId xmlns:a16="http://schemas.microsoft.com/office/drawing/2014/main" id="{01E41460-FDBC-9A41-97EF-1F4C1158EBCC}"/>
+                </a:ext>
+              </a:extLst>
+            </p:cNvPr>
+            <p:cNvPicPr>
+              <a:picLocks noChangeAspect="1" noChangeArrowheads="1"/>
+            </p:cNvPicPr>
+            <p:nvPr/>
+          </p:nvPicPr>
+          <p:blipFill rotWithShape="1">
+            <a:blip r:embed="rId2">
+              <a:lum bright="70000" contrast="-70000"/>
+              <a:extLst>
+                <a:ext uri="{BEBA8EAE-BF5A-486C-A8C5-ECC9F3942E4B}">
+                  <a14:imgProps xmlns:a14="http://schemas.microsoft.com/office/drawing/2010/main">
+                    <a14:imgLayer r:embed="rId3">
+                      <a14:imgEffect>
+                        <a14:colorTemperature colorTemp="4539"/>
+                      </a14:imgEffect>
+                      <a14:imgEffect>
+                        <a14:saturation sat="113000"/>
+                      </a14:imgEffect>
+                    </a14:imgLayer>
+                  </a14:imgProps>
+                </a:ext>
+                <a:ext uri="{28A0092B-C50C-407E-A947-70E740481C1C}">
+                  <a14:useLocalDpi xmlns:a14="http://schemas.microsoft.com/office/drawing/2010/main" val="0"/>
+                </a:ext>
+              </a:extLst>
+            </a:blip>
+            <a:srcRect b="23756"/>
+            <a:stretch/>
+          </p:blipFill>
+          <p:spPr bwMode="auto">
+            <a:xfrm>
+              <a:off x="6071149" y="3009236"/>
+              <a:ext cx="1078823" cy="822536"/>
+            </a:xfrm>
+            <a:prstGeom prst="rect">
+              <a:avLst/>
+            </a:prstGeom>
+            <a:noFill/>
+            <a:extLst>
+              <a:ext uri="{909E8E84-426E-40DD-AFC4-6F175D3DCCD1}">
+                <a14:hiddenFill xmlns:a14="http://schemas.microsoft.com/office/drawing/2010/main">
+                  <a:solidFill>
+                    <a:srgbClr val="FFFFFF"/>
+                  </a:solidFill>
+                </a14:hiddenFill>
+              </a:ext>
+            </a:extLst>
+          </p:spPr>
+        </p:pic>
+      </p:grpSp>
+    </p:spTree>
+    <p:extLst>
+      <p:ext uri="{BB962C8B-B14F-4D97-AF65-F5344CB8AC3E}">
+        <p14:creationId xmlns:p14="http://schemas.microsoft.com/office/powerpoint/2010/main" val="2845561318"/>
+      </p:ext>
+    </p:extLst>
+  </p:cSld>
+  <p:clrMapOvr>
+    <a:masterClrMapping/>
+  </p:clrMapOvr>
+</p:sld>
+</file>
+
+<file path=ppt/slides/slide4.xml><?xml version="1.0" encoding="utf-8"?>
 <p:sld xmlns:a="http://schemas.openxmlformats.org/drawingml/2006/main" xmlns:r="http://schemas.openxmlformats.org/officeDocument/2006/relationships" xmlns:p="http://schemas.openxmlformats.org/presentationml/2006/main">
   <p:cSld>
     <p:spTree>
@@ -4352,7 +5167,7 @@
 </p:sld>
 </file>
 
-<file path=ppt/slides/slide4.xml><?xml version="1.0" encoding="utf-8"?>
+<file path=ppt/slides/slide5.xml><?xml version="1.0" encoding="utf-8"?>
 <p:sld xmlns:a="http://schemas.openxmlformats.org/drawingml/2006/main" xmlns:r="http://schemas.openxmlformats.org/officeDocument/2006/relationships" xmlns:p="http://schemas.openxmlformats.org/presentationml/2006/main">
   <p:cSld>
     <p:spTree>
@@ -4605,7 +5420,7 @@
 </p:sld>
 </file>
 
-<file path=ppt/slides/slide5.xml><?xml version="1.0" encoding="utf-8"?>
+<file path=ppt/slides/slide6.xml><?xml version="1.0" encoding="utf-8"?>
 <p:sld xmlns:a="http://schemas.openxmlformats.org/drawingml/2006/main" xmlns:r="http://schemas.openxmlformats.org/officeDocument/2006/relationships" xmlns:p="http://schemas.openxmlformats.org/presentationml/2006/main">
   <p:cSld>
     <p:spTree>
@@ -5203,7 +6018,7 @@
 </p:sld>
 </file>
 
-<file path=ppt/slides/slide6.xml><?xml version="1.0" encoding="utf-8"?>
+<file path=ppt/slides/slide7.xml><?xml version="1.0" encoding="utf-8"?>
 <p:sld xmlns:a="http://schemas.openxmlformats.org/drawingml/2006/main" xmlns:r="http://schemas.openxmlformats.org/officeDocument/2006/relationships" xmlns:p="http://schemas.openxmlformats.org/presentationml/2006/main">
   <p:cSld>
     <p:spTree>
@@ -5816,7 +6631,7 @@
 </p:sld>
 </file>
 
-<file path=ppt/slides/slide7.xml><?xml version="1.0" encoding="utf-8"?>
+<file path=ppt/slides/slide8.xml><?xml version="1.0" encoding="utf-8"?>
 <p:sld xmlns:a="http://schemas.openxmlformats.org/drawingml/2006/main" xmlns:r="http://schemas.openxmlformats.org/officeDocument/2006/relationships" xmlns:p="http://schemas.openxmlformats.org/presentationml/2006/main">
   <p:cSld>
     <p:spTree>
@@ -6241,7 +7056,7 @@
 </p:sld>
 </file>
 
-<file path=ppt/slides/slide8.xml><?xml version="1.0" encoding="utf-8"?>
+<file path=ppt/slides/slide9.xml><?xml version="1.0" encoding="utf-8"?>
 <p:sld xmlns:a="http://schemas.openxmlformats.org/drawingml/2006/main" xmlns:r="http://schemas.openxmlformats.org/officeDocument/2006/relationships" xmlns:p="http://schemas.openxmlformats.org/presentationml/2006/main">
   <p:cSld>
     <p:spTree>
@@ -6667,483 +7482,6 @@
     <p:extLst>
       <p:ext uri="{BB962C8B-B14F-4D97-AF65-F5344CB8AC3E}">
         <p14:creationId xmlns:p14="http://schemas.microsoft.com/office/powerpoint/2010/main" val="3269780707"/>
-      </p:ext>
-    </p:extLst>
-  </p:cSld>
-  <p:clrMapOvr>
-    <a:masterClrMapping/>
-  </p:clrMapOvr>
-</p:sld>
-</file>
-
-<file path=ppt/slides/slide9.xml><?xml version="1.0" encoding="utf-8"?>
-<p:sld xmlns:a="http://schemas.openxmlformats.org/drawingml/2006/main" xmlns:r="http://schemas.openxmlformats.org/officeDocument/2006/relationships" xmlns:p="http://schemas.openxmlformats.org/presentationml/2006/main">
-  <p:cSld>
-    <p:spTree>
-      <p:nvGrpSpPr>
-        <p:cNvPr id="1" name=""/>
-        <p:cNvGrpSpPr/>
-        <p:nvPr/>
-      </p:nvGrpSpPr>
-      <p:grpSpPr>
-        <a:xfrm>
-          <a:off x="0" y="0"/>
-          <a:ext cx="0" cy="0"/>
-          <a:chOff x="0" y="0"/>
-          <a:chExt cx="0" cy="0"/>
-        </a:xfrm>
-      </p:grpSpPr>
-      <p:grpSp>
-        <p:nvGrpSpPr>
-          <p:cNvPr id="14" name="Group 13">
-            <a:extLst>
-              <a:ext uri="{FF2B5EF4-FFF2-40B4-BE49-F238E27FC236}">
-                <a16:creationId xmlns:a16="http://schemas.microsoft.com/office/drawing/2014/main" id="{5F00CA81-8DE0-0A4C-BF8B-E48C2C1B7907}"/>
-              </a:ext>
-            </a:extLst>
-          </p:cNvPr>
-          <p:cNvGrpSpPr/>
-          <p:nvPr/>
-        </p:nvGrpSpPr>
-        <p:grpSpPr>
-          <a:xfrm>
-            <a:off x="2652799" y="1686179"/>
-            <a:ext cx="3657600" cy="3657600"/>
-            <a:chOff x="2652799" y="1686179"/>
-            <a:chExt cx="3657600" cy="3657600"/>
-          </a:xfrm>
-        </p:grpSpPr>
-        <p:sp>
-          <p:nvSpPr>
-            <p:cNvPr id="5" name="Oval 4">
-              <a:extLst>
-                <a:ext uri="{FF2B5EF4-FFF2-40B4-BE49-F238E27FC236}">
-                  <a16:creationId xmlns:a16="http://schemas.microsoft.com/office/drawing/2014/main" id="{4FA07E0E-649D-6C4D-8516-27C02727DD97}"/>
-                </a:ext>
-              </a:extLst>
-            </p:cNvPr>
-            <p:cNvSpPr/>
-            <p:nvPr/>
-          </p:nvSpPr>
-          <p:spPr>
-            <a:xfrm>
-              <a:off x="2652799" y="1686179"/>
-              <a:ext cx="3657600" cy="3657600"/>
-            </a:xfrm>
-            <a:prstGeom prst="ellipse">
-              <a:avLst/>
-            </a:prstGeom>
-            <a:solidFill>
-              <a:srgbClr val="935FB2"/>
-            </a:solidFill>
-            <a:ln>
-              <a:noFill/>
-            </a:ln>
-            <a:effectLst/>
-          </p:spPr>
-          <p:style>
-            <a:lnRef idx="2">
-              <a:schemeClr val="accent1">
-                <a:shade val="50000"/>
-              </a:schemeClr>
-            </a:lnRef>
-            <a:fillRef idx="1">
-              <a:schemeClr val="accent1"/>
-            </a:fillRef>
-            <a:effectRef idx="0">
-              <a:schemeClr val="accent1"/>
-            </a:effectRef>
-            <a:fontRef idx="minor">
-              <a:schemeClr val="lt1"/>
-            </a:fontRef>
-          </p:style>
-          <p:txBody>
-            <a:bodyPr rtlCol="0" anchor="ctr"/>
-            <a:lstStyle/>
-            <a:p>
-              <a:pPr algn="r"/>
-              <a:endParaRPr lang="en-US"/>
-            </a:p>
-          </p:txBody>
-        </p:sp>
-        <p:sp>
-          <p:nvSpPr>
-            <p:cNvPr id="6" name="Folded Corner 5">
-              <a:extLst>
-                <a:ext uri="{FF2B5EF4-FFF2-40B4-BE49-F238E27FC236}">
-                  <a16:creationId xmlns:a16="http://schemas.microsoft.com/office/drawing/2014/main" id="{03D8A4EE-828D-BA49-9EA2-43DF24757832}"/>
-                </a:ext>
-              </a:extLst>
-            </p:cNvPr>
-            <p:cNvSpPr/>
-            <p:nvPr/>
-          </p:nvSpPr>
-          <p:spPr>
-            <a:xfrm rot="10800000" flipH="1">
-              <a:off x="3632513" y="2479475"/>
-              <a:ext cx="1698171" cy="2071008"/>
-            </a:xfrm>
-            <a:prstGeom prst="foldedCorner">
-              <a:avLst>
-                <a:gd name="adj" fmla="val 38876"/>
-              </a:avLst>
-            </a:prstGeom>
-            <a:solidFill>
-              <a:schemeClr val="bg1"/>
-            </a:solidFill>
-            <a:ln>
-              <a:noFill/>
-            </a:ln>
-            <a:effectLst>
-              <a:outerShdw blurRad="93626" dist="97833" dir="2700000" algn="tl" rotWithShape="0">
-                <a:prstClr val="black">
-                  <a:alpha val="27026"/>
-                </a:prstClr>
-              </a:outerShdw>
-            </a:effectLst>
-          </p:spPr>
-          <p:style>
-            <a:lnRef idx="2">
-              <a:schemeClr val="accent1">
-                <a:shade val="50000"/>
-              </a:schemeClr>
-            </a:lnRef>
-            <a:fillRef idx="1">
-              <a:schemeClr val="accent1"/>
-            </a:fillRef>
-            <a:effectRef idx="0">
-              <a:schemeClr val="accent1"/>
-            </a:effectRef>
-            <a:fontRef idx="minor">
-              <a:schemeClr val="lt1"/>
-            </a:fontRef>
-          </p:style>
-          <p:txBody>
-            <a:bodyPr rtlCol="0" anchor="ctr"/>
-            <a:lstStyle/>
-            <a:p>
-              <a:pPr algn="r"/>
-              <a:endParaRPr lang="en-US" dirty="0"/>
-            </a:p>
-          </p:txBody>
-        </p:sp>
-        <p:sp>
-          <p:nvSpPr>
-            <p:cNvPr id="7" name="Right Triangle 6">
-              <a:extLst>
-                <a:ext uri="{FF2B5EF4-FFF2-40B4-BE49-F238E27FC236}">
-                  <a16:creationId xmlns:a16="http://schemas.microsoft.com/office/drawing/2014/main" id="{96A7A3DF-AB2B-774B-BB8A-FDD94167610E}"/>
-                </a:ext>
-              </a:extLst>
-            </p:cNvPr>
-            <p:cNvSpPr/>
-            <p:nvPr/>
-          </p:nvSpPr>
-          <p:spPr>
-            <a:xfrm>
-              <a:off x="4671010" y="2474395"/>
-              <a:ext cx="659674" cy="667568"/>
-            </a:xfrm>
-            <a:prstGeom prst="rtTriangle">
-              <a:avLst/>
-            </a:prstGeom>
-            <a:solidFill>
-              <a:srgbClr val="59396C"/>
-            </a:solidFill>
-            <a:ln>
-              <a:noFill/>
-            </a:ln>
-          </p:spPr>
-          <p:style>
-            <a:lnRef idx="2">
-              <a:schemeClr val="accent1">
-                <a:shade val="50000"/>
-              </a:schemeClr>
-            </a:lnRef>
-            <a:fillRef idx="1">
-              <a:schemeClr val="accent1"/>
-            </a:fillRef>
-            <a:effectRef idx="0">
-              <a:schemeClr val="accent1"/>
-            </a:effectRef>
-            <a:fontRef idx="minor">
-              <a:schemeClr val="lt1"/>
-            </a:fontRef>
-          </p:style>
-          <p:txBody>
-            <a:bodyPr rtlCol="0" anchor="ctr"/>
-            <a:lstStyle/>
-            <a:p>
-              <a:pPr algn="r"/>
-              <a:endParaRPr lang="en-US" dirty="0"/>
-            </a:p>
-          </p:txBody>
-        </p:sp>
-        <p:sp>
-          <p:nvSpPr>
-            <p:cNvPr id="8" name="Rounded Rectangle 7">
-              <a:extLst>
-                <a:ext uri="{FF2B5EF4-FFF2-40B4-BE49-F238E27FC236}">
-                  <a16:creationId xmlns:a16="http://schemas.microsoft.com/office/drawing/2014/main" id="{C5154D1B-2CB8-094B-AE28-726A79E91954}"/>
-                </a:ext>
-              </a:extLst>
-            </p:cNvPr>
-            <p:cNvSpPr/>
-            <p:nvPr/>
-          </p:nvSpPr>
-          <p:spPr>
-            <a:xfrm>
-              <a:off x="4112735" y="3405098"/>
-              <a:ext cx="801261" cy="103486"/>
-            </a:xfrm>
-            <a:prstGeom prst="roundRect">
-              <a:avLst/>
-            </a:prstGeom>
-            <a:solidFill>
-              <a:schemeClr val="bg1"/>
-            </a:solidFill>
-            <a:ln>
-              <a:noFill/>
-            </a:ln>
-          </p:spPr>
-          <p:style>
-            <a:lnRef idx="2">
-              <a:schemeClr val="accent1">
-                <a:shade val="50000"/>
-              </a:schemeClr>
-            </a:lnRef>
-            <a:fillRef idx="1">
-              <a:schemeClr val="accent1"/>
-            </a:fillRef>
-            <a:effectRef idx="0">
-              <a:schemeClr val="accent1"/>
-            </a:effectRef>
-            <a:fontRef idx="minor">
-              <a:schemeClr val="lt1"/>
-            </a:fontRef>
-          </p:style>
-          <p:txBody>
-            <a:bodyPr rtlCol="0" anchor="ctr"/>
-            <a:lstStyle/>
-            <a:p>
-              <a:pPr algn="r"/>
-              <a:endParaRPr lang="en-US"/>
-            </a:p>
-          </p:txBody>
-        </p:sp>
-        <p:sp>
-          <p:nvSpPr>
-            <p:cNvPr id="9" name="Rounded Rectangle 8">
-              <a:extLst>
-                <a:ext uri="{FF2B5EF4-FFF2-40B4-BE49-F238E27FC236}">
-                  <a16:creationId xmlns:a16="http://schemas.microsoft.com/office/drawing/2014/main" id="{31AC0A3B-0BF9-594C-BA71-6E136A2CE3EA}"/>
-                </a:ext>
-              </a:extLst>
-            </p:cNvPr>
-            <p:cNvSpPr/>
-            <p:nvPr/>
-          </p:nvSpPr>
-          <p:spPr>
-            <a:xfrm>
-              <a:off x="4112734" y="3599139"/>
-              <a:ext cx="801261" cy="114036"/>
-            </a:xfrm>
-            <a:prstGeom prst="roundRect">
-              <a:avLst/>
-            </a:prstGeom>
-            <a:solidFill>
-              <a:schemeClr val="bg1"/>
-            </a:solidFill>
-            <a:ln>
-              <a:noFill/>
-            </a:ln>
-          </p:spPr>
-          <p:style>
-            <a:lnRef idx="2">
-              <a:schemeClr val="accent1">
-                <a:shade val="50000"/>
-              </a:schemeClr>
-            </a:lnRef>
-            <a:fillRef idx="1">
-              <a:schemeClr val="accent1"/>
-            </a:fillRef>
-            <a:effectRef idx="0">
-              <a:schemeClr val="accent1"/>
-            </a:effectRef>
-            <a:fontRef idx="minor">
-              <a:schemeClr val="lt1"/>
-            </a:fontRef>
-          </p:style>
-          <p:txBody>
-            <a:bodyPr rtlCol="0" anchor="ctr"/>
-            <a:lstStyle/>
-            <a:p>
-              <a:pPr algn="r"/>
-              <a:endParaRPr lang="en-US"/>
-            </a:p>
-          </p:txBody>
-        </p:sp>
-        <p:sp>
-          <p:nvSpPr>
-            <p:cNvPr id="10" name="Rounded Rectangle 9">
-              <a:extLst>
-                <a:ext uri="{FF2B5EF4-FFF2-40B4-BE49-F238E27FC236}">
-                  <a16:creationId xmlns:a16="http://schemas.microsoft.com/office/drawing/2014/main" id="{D44F7BD0-123D-364B-A7A2-BFE0AA7C2FDA}"/>
-                </a:ext>
-              </a:extLst>
-            </p:cNvPr>
-            <p:cNvSpPr/>
-            <p:nvPr/>
-          </p:nvSpPr>
-          <p:spPr>
-            <a:xfrm>
-              <a:off x="4112734" y="3813743"/>
-              <a:ext cx="801261" cy="114036"/>
-            </a:xfrm>
-            <a:prstGeom prst="roundRect">
-              <a:avLst/>
-            </a:prstGeom>
-            <a:solidFill>
-              <a:schemeClr val="bg1"/>
-            </a:solidFill>
-            <a:ln>
-              <a:noFill/>
-            </a:ln>
-          </p:spPr>
-          <p:style>
-            <a:lnRef idx="2">
-              <a:schemeClr val="accent1">
-                <a:shade val="50000"/>
-              </a:schemeClr>
-            </a:lnRef>
-            <a:fillRef idx="1">
-              <a:schemeClr val="accent1"/>
-            </a:fillRef>
-            <a:effectRef idx="0">
-              <a:schemeClr val="accent1"/>
-            </a:effectRef>
-            <a:fontRef idx="minor">
-              <a:schemeClr val="lt1"/>
-            </a:fontRef>
-          </p:style>
-          <p:txBody>
-            <a:bodyPr rtlCol="0" anchor="ctr"/>
-            <a:lstStyle/>
-            <a:p>
-              <a:pPr algn="r"/>
-              <a:endParaRPr lang="en-US"/>
-            </a:p>
-          </p:txBody>
-        </p:sp>
-        <p:sp>
-          <p:nvSpPr>
-            <p:cNvPr id="12" name="Oval 11">
-              <a:extLst>
-                <a:ext uri="{FF2B5EF4-FFF2-40B4-BE49-F238E27FC236}">
-                  <a16:creationId xmlns:a16="http://schemas.microsoft.com/office/drawing/2014/main" id="{0DBA4606-935D-B144-A85D-10532E93C82D}"/>
-                </a:ext>
-              </a:extLst>
-            </p:cNvPr>
-            <p:cNvSpPr/>
-            <p:nvPr/>
-          </p:nvSpPr>
-          <p:spPr>
-            <a:xfrm>
-              <a:off x="4023361" y="3148494"/>
-              <a:ext cx="920932" cy="894460"/>
-            </a:xfrm>
-            <a:prstGeom prst="ellipse">
-              <a:avLst/>
-            </a:prstGeom>
-            <a:solidFill>
-              <a:srgbClr val="935FB2"/>
-            </a:solidFill>
-            <a:ln>
-              <a:noFill/>
-            </a:ln>
-          </p:spPr>
-          <p:style>
-            <a:lnRef idx="2">
-              <a:schemeClr val="accent1">
-                <a:shade val="50000"/>
-              </a:schemeClr>
-            </a:lnRef>
-            <a:fillRef idx="1">
-              <a:schemeClr val="accent1"/>
-            </a:fillRef>
-            <a:effectRef idx="0">
-              <a:schemeClr val="accent1"/>
-            </a:effectRef>
-            <a:fontRef idx="minor">
-              <a:schemeClr val="lt1"/>
-            </a:fontRef>
-          </p:style>
-          <p:txBody>
-            <a:bodyPr rtlCol="0" anchor="ctr"/>
-            <a:lstStyle/>
-            <a:p>
-              <a:pPr algn="ctr"/>
-              <a:endParaRPr lang="en-US" dirty="0"/>
-            </a:p>
-          </p:txBody>
-        </p:sp>
-        <p:sp>
-          <p:nvSpPr>
-            <p:cNvPr id="13" name="Triangle 12">
-              <a:extLst>
-                <a:ext uri="{FF2B5EF4-FFF2-40B4-BE49-F238E27FC236}">
-                  <a16:creationId xmlns:a16="http://schemas.microsoft.com/office/drawing/2014/main" id="{9F017A09-C57B-3A4F-9E05-EDB7910E1694}"/>
-                </a:ext>
-              </a:extLst>
-            </p:cNvPr>
-            <p:cNvSpPr/>
-            <p:nvPr/>
-          </p:nvSpPr>
-          <p:spPr>
-            <a:xfrm rot="5400000">
-              <a:off x="4323943" y="3386829"/>
-              <a:ext cx="411480" cy="411480"/>
-            </a:xfrm>
-            <a:prstGeom prst="triangle">
-              <a:avLst/>
-            </a:prstGeom>
-            <a:solidFill>
-              <a:schemeClr val="bg1"/>
-            </a:solidFill>
-            <a:ln>
-              <a:noFill/>
-            </a:ln>
-          </p:spPr>
-          <p:style>
-            <a:lnRef idx="2">
-              <a:schemeClr val="accent1">
-                <a:shade val="50000"/>
-              </a:schemeClr>
-            </a:lnRef>
-            <a:fillRef idx="1">
-              <a:schemeClr val="accent1"/>
-            </a:fillRef>
-            <a:effectRef idx="0">
-              <a:schemeClr val="accent1"/>
-            </a:effectRef>
-            <a:fontRef idx="minor">
-              <a:schemeClr val="lt1"/>
-            </a:fontRef>
-          </p:style>
-          <p:txBody>
-            <a:bodyPr rtlCol="0" anchor="ctr"/>
-            <a:lstStyle/>
-            <a:p>
-              <a:pPr algn="ctr"/>
-              <a:endParaRPr lang="en-US"/>
-            </a:p>
-          </p:txBody>
-        </p:sp>
-      </p:grpSp>
-    </p:spTree>
-    <p:extLst>
-      <p:ext uri="{BB962C8B-B14F-4D97-AF65-F5344CB8AC3E}">
-        <p14:creationId xmlns:p14="http://schemas.microsoft.com/office/powerpoint/2010/main" val="925314315"/>
       </p:ext>
     </p:extLst>
   </p:cSld>

</xml_diff>